<commit_message>
Real Final PP Presentation
</commit_message>
<xml_diff>
--- a/Power Point/Project 3-Trends in Foster Care-FINAL.pptx
+++ b/Power Point/Project 3-Trends in Foster Care-FINAL.pptx
@@ -6262,7 +6262,7 @@
                 </a:solidFill>
                 <a:latin typeface="+mn-lt"/>
               </a:rPr>
-              <a:t>A data analysis and predictive model of  foster care </a:t>
+              <a:t>A Data Analysis and Predictive Model of  Foster Care </a:t>
             </a:r>
             <a:br>
               <a:rPr lang="en-US" sz="1600" i="1" dirty="0">
@@ -6279,7 +6279,7 @@
                 </a:solidFill>
                 <a:latin typeface="+mn-lt"/>
               </a:rPr>
-              <a:t>trends in The Midwestern United States</a:t>
+              <a:t>Trends in the Midwestern United States</a:t>
             </a:r>
           </a:p>
         </p:txBody>
@@ -8629,7 +8629,7 @@
         <p:spPr>
           <a:xfrm>
             <a:off x="632695" y="1535797"/>
-            <a:ext cx="4524375" cy="4322337"/>
+            <a:ext cx="4524375" cy="4605492"/>
           </a:xfrm>
           <a:prstGeom prst="rect">
             <a:avLst/>
@@ -8705,7 +8705,7 @@
                 <a:ea typeface="Calibri" panose="020F0502020204030204" pitchFamily="34" charset="0"/>
                 <a:cs typeface="Times New Roman" panose="02020603050405020304" pitchFamily="18" charset="0"/>
               </a:rPr>
-              <a:t>developed a model to predict what the foster care needs will be in 5, 10, and 20 years from now in selected states.  We will be looking at predicting the number of children in care as well as TPR predictions for the future </a:t>
+              <a:t>developed a model to predict what the foster care needs will be in 5, 10, and 20 years from now in selected states.  We will be looking at predicting the number of children in care as well as Terminations of Parental Rights (TPR) predictions for the future </a:t>
             </a:r>
             <a:r>
               <a:rPr lang="en-US" sz="1600" b="1" dirty="0">
@@ -10037,7 +10037,7 @@
         <p:spPr>
           <a:xfrm>
             <a:off x="998289" y="1224793"/>
-            <a:ext cx="8355436" cy="4247317"/>
+            <a:ext cx="8355436" cy="3970318"/>
           </a:xfrm>
           <a:prstGeom prst="rect">
             <a:avLst/>
@@ -10096,7 +10096,7 @@
                   <a:schemeClr val="bg1"/>
                 </a:solidFill>
               </a:rPr>
-              <a:t>The interactive website shows data compiled for all 50 states showing the number of children in care, the number of adoptions and the number of terminations of parental rights (TPR) over the 10-year period</a:t>
+              <a:t>The interactive website shows data compiled for all 50 states showing the number of children in care, the number of adoptions and the number of TPRs over the 10-year period</a:t>
             </a:r>
           </a:p>
           <a:p>
@@ -10984,24 +10984,6 @@
 </file>
 
 <file path=customXml/item1.xml><?xml version="1.0" encoding="utf-8"?>
-<?mso-contentType ?>
-<FormTemplates xmlns="http://schemas.microsoft.com/sharepoint/v3/contenttype/forms">
-  <Display>DocumentLibraryForm</Display>
-  <Edit>DocumentLibraryForm</Edit>
-  <New>DocumentLibraryForm</New>
-</FormTemplates>
-</file>
-
-<file path=customXml/item2.xml><?xml version="1.0" encoding="utf-8"?>
-<p:properties xmlns:p="http://schemas.microsoft.com/office/2006/metadata/properties" xmlns:xsi="http://www.w3.org/2001/XMLSchema-instance" xmlns:pc="http://schemas.microsoft.com/office/infopath/2007/PartnerControls">
-  <documentManagement>
-    <Status xmlns="71af3243-3dd4-4a8d-8c0d-dd76da1f02a5">Not started</Status>
-    <MediaServiceKeyPoints xmlns="71af3243-3dd4-4a8d-8c0d-dd76da1f02a5" xsi:nil="true"/>
-  </documentManagement>
-</p:properties>
-</file>
-
-<file path=customXml/item3.xml><?xml version="1.0" encoding="utf-8"?>
 <ct:contentTypeSchema xmlns:ct="http://schemas.microsoft.com/office/2006/metadata/contentType" xmlns:ma="http://schemas.microsoft.com/office/2006/metadata/properties/metaAttributes" ct:_="" ma:_="" ma:contentTypeName="Document" ma:contentTypeID="0x01010079F111ED35F8CC479449609E8A0923A6" ma:contentTypeVersion="12" ma:contentTypeDescription="Create a new document." ma:contentTypeScope="" ma:versionID="426e97fa315356fffbdcd9876fe988c2">
   <xsd:schema xmlns:xsd="http://www.w3.org/2001/XMLSchema" xmlns:xs="http://www.w3.org/2001/XMLSchema" xmlns:p="http://schemas.microsoft.com/office/2006/metadata/properties" xmlns:ns2="71af3243-3dd4-4a8d-8c0d-dd76da1f02a5" xmlns:ns3="16c05727-aa75-4e4a-9b5f-8a80a1165891" targetNamespace="http://schemas.microsoft.com/office/2006/metadata/properties" ma:root="true" ma:fieldsID="14b8f0def80e6d70ce3def20c90759ae" ns2:_="" ns3:_="">
     <xsd:import namespace="71af3243-3dd4-4a8d-8c0d-dd76da1f02a5"/>
@@ -11222,25 +11204,25 @@
 </ct:contentTypeSchema>
 </file>
 
-<file path=customXml/itemProps1.xml><?xml version="1.0" encoding="utf-8"?>
-<ds:datastoreItem xmlns:ds="http://schemas.openxmlformats.org/officeDocument/2006/customXml" ds:itemID="{53A10211-FBDE-44DA-8AD6-29E596B2975F}">
-  <ds:schemaRefs>
-    <ds:schemaRef ds:uri="http://schemas.microsoft.com/sharepoint/v3/contenttype/forms"/>
-  </ds:schemaRefs>
-</ds:datastoreItem>
+<file path=customXml/item2.xml><?xml version="1.0" encoding="utf-8"?>
+<p:properties xmlns:p="http://schemas.microsoft.com/office/2006/metadata/properties" xmlns:xsi="http://www.w3.org/2001/XMLSchema-instance" xmlns:pc="http://schemas.microsoft.com/office/infopath/2007/PartnerControls">
+  <documentManagement>
+    <Status xmlns="71af3243-3dd4-4a8d-8c0d-dd76da1f02a5">Not started</Status>
+    <MediaServiceKeyPoints xmlns="71af3243-3dd4-4a8d-8c0d-dd76da1f02a5" xsi:nil="true"/>
+  </documentManagement>
+</p:properties>
 </file>
 
-<file path=customXml/itemProps2.xml><?xml version="1.0" encoding="utf-8"?>
-<ds:datastoreItem xmlns:ds="http://schemas.openxmlformats.org/officeDocument/2006/customXml" ds:itemID="{D0976319-4513-485C-AD3A-E56C39927A38}">
-  <ds:schemaRefs>
-    <ds:schemaRef ds:uri="http://schemas.microsoft.com/office/2006/metadata/properties"/>
-    <ds:schemaRef ds:uri="http://schemas.microsoft.com/office/infopath/2007/PartnerControls"/>
-    <ds:schemaRef ds:uri="71af3243-3dd4-4a8d-8c0d-dd76da1f02a5"/>
-  </ds:schemaRefs>
-</ds:datastoreItem>
+<file path=customXml/item3.xml><?xml version="1.0" encoding="utf-8"?>
+<?mso-contentType ?>
+<FormTemplates xmlns="http://schemas.microsoft.com/sharepoint/v3/contenttype/forms">
+  <Display>DocumentLibraryForm</Display>
+  <Edit>DocumentLibraryForm</Edit>
+  <New>DocumentLibraryForm</New>
+</FormTemplates>
 </file>
 
-<file path=customXml/itemProps3.xml><?xml version="1.0" encoding="utf-8"?>
+<file path=customXml/itemProps1.xml><?xml version="1.0" encoding="utf-8"?>
 <ds:datastoreItem xmlns:ds="http://schemas.openxmlformats.org/officeDocument/2006/customXml" ds:itemID="{6A1B7BBB-8F46-4BA8-85EC-2ECC1D2E3290}">
   <ds:schemaRefs>
     <ds:schemaRef ds:uri="http://schemas.microsoft.com/office/2006/metadata/contentType"/>
@@ -11257,4 +11239,22 @@
     <ds:schemaRef ds:uri="http://schemas.microsoft.com/internal/obd"/>
   </ds:schemaRefs>
 </ds:datastoreItem>
+</file>
+
+<file path=customXml/itemProps2.xml><?xml version="1.0" encoding="utf-8"?>
+<ds:datastoreItem xmlns:ds="http://schemas.openxmlformats.org/officeDocument/2006/customXml" ds:itemID="{D0976319-4513-485C-AD3A-E56C39927A38}">
+  <ds:schemaRefs>
+    <ds:schemaRef ds:uri="http://schemas.microsoft.com/office/2006/metadata/properties"/>
+    <ds:schemaRef ds:uri="http://schemas.microsoft.com/office/infopath/2007/PartnerControls"/>
+    <ds:schemaRef ds:uri="71af3243-3dd4-4a8d-8c0d-dd76da1f02a5"/>
+  </ds:schemaRefs>
+</ds:datastoreItem>
+</file>
+
+<file path=customXml/itemProps3.xml><?xml version="1.0" encoding="utf-8"?>
+<ds:datastoreItem xmlns:ds="http://schemas.openxmlformats.org/officeDocument/2006/customXml" ds:itemID="{53A10211-FBDE-44DA-8AD6-29E596B2975F}">
+  <ds:schemaRefs>
+    <ds:schemaRef ds:uri="http://schemas.microsoft.com/sharepoint/v3/contenttype/forms"/>
+  </ds:schemaRefs>
+</ds:datastoreItem>
 </file>
</xml_diff>